<commit_message>
Split screen: Crop PS toolbar, highlight selected node in graph
</commit_message>
<xml_diff>
--- a/img/ideation/Ideas.pptx
+++ b/img/ideation/Ideas.pptx
@@ -108,7 +108,7 @@
   </p:defaultTextStyle>
   <p:extLst>
     <p:ext uri="{EFAFB233-063F-42B5-8137-9DF3F51BA10A}">
-      <p15:sldGuideLst xmlns:p15="http://schemas.microsoft.com/office/powerpoint/2012/main"/>
+      <p15:sldGuideLst xmlns:p15="http://schemas.microsoft.com/office/powerpoint/2012/main" xmlns=""/>
     </p:ext>
   </p:extLst>
 </p:presentation>
@@ -245,7 +245,7 @@
           <a:p>
             <a:fld id="{EDE79463-B6B2-4EDB-A96C-E4F90289A975}" type="datetimeFigureOut">
               <a:rPr lang="en-US" smtClean="0"/>
-              <a:t>10/17/2018</a:t>
+              <a:t>10/18/2018</a:t>
             </a:fld>
             <a:endParaRPr lang="en-US"/>
           </a:p>
@@ -287,7 +287,7 @@
           <a:p>
             <a:fld id="{F8722A89-AFF2-4300-953B-7AE403F6FDAF}" type="slidenum">
               <a:rPr lang="en-US" smtClean="0"/>
-              <a:t>‹#›</a:t>
+              <a:t>‹Nr.›</a:t>
             </a:fld>
             <a:endParaRPr lang="en-US"/>
           </a:p>
@@ -415,7 +415,7 @@
           <a:p>
             <a:fld id="{EDE79463-B6B2-4EDB-A96C-E4F90289A975}" type="datetimeFigureOut">
               <a:rPr lang="en-US" smtClean="0"/>
-              <a:t>10/17/2018</a:t>
+              <a:t>10/18/2018</a:t>
             </a:fld>
             <a:endParaRPr lang="en-US"/>
           </a:p>
@@ -457,7 +457,7 @@
           <a:p>
             <a:fld id="{F8722A89-AFF2-4300-953B-7AE403F6FDAF}" type="slidenum">
               <a:rPr lang="en-US" smtClean="0"/>
-              <a:t>‹#›</a:t>
+              <a:t>‹Nr.›</a:t>
             </a:fld>
             <a:endParaRPr lang="en-US"/>
           </a:p>
@@ -595,7 +595,7 @@
           <a:p>
             <a:fld id="{EDE79463-B6B2-4EDB-A96C-E4F90289A975}" type="datetimeFigureOut">
               <a:rPr lang="en-US" smtClean="0"/>
-              <a:t>10/17/2018</a:t>
+              <a:t>10/18/2018</a:t>
             </a:fld>
             <a:endParaRPr lang="en-US"/>
           </a:p>
@@ -637,7 +637,7 @@
           <a:p>
             <a:fld id="{F8722A89-AFF2-4300-953B-7AE403F6FDAF}" type="slidenum">
               <a:rPr lang="en-US" smtClean="0"/>
-              <a:t>‹#›</a:t>
+              <a:t>‹Nr.›</a:t>
             </a:fld>
             <a:endParaRPr lang="en-US"/>
           </a:p>
@@ -765,7 +765,7 @@
           <a:p>
             <a:fld id="{EDE79463-B6B2-4EDB-A96C-E4F90289A975}" type="datetimeFigureOut">
               <a:rPr lang="en-US" smtClean="0"/>
-              <a:t>10/17/2018</a:t>
+              <a:t>10/18/2018</a:t>
             </a:fld>
             <a:endParaRPr lang="en-US"/>
           </a:p>
@@ -807,7 +807,7 @@
           <a:p>
             <a:fld id="{F8722A89-AFF2-4300-953B-7AE403F6FDAF}" type="slidenum">
               <a:rPr lang="en-US" smtClean="0"/>
-              <a:t>‹#›</a:t>
+              <a:t>‹Nr.›</a:t>
             </a:fld>
             <a:endParaRPr lang="en-US"/>
           </a:p>
@@ -1011,7 +1011,7 @@
           <a:p>
             <a:fld id="{EDE79463-B6B2-4EDB-A96C-E4F90289A975}" type="datetimeFigureOut">
               <a:rPr lang="en-US" smtClean="0"/>
-              <a:t>10/17/2018</a:t>
+              <a:t>10/18/2018</a:t>
             </a:fld>
             <a:endParaRPr lang="en-US"/>
           </a:p>
@@ -1053,7 +1053,7 @@
           <a:p>
             <a:fld id="{F8722A89-AFF2-4300-953B-7AE403F6FDAF}" type="slidenum">
               <a:rPr lang="en-US" smtClean="0"/>
-              <a:t>‹#›</a:t>
+              <a:t>‹Nr.›</a:t>
             </a:fld>
             <a:endParaRPr lang="en-US"/>
           </a:p>
@@ -1243,7 +1243,7 @@
           <a:p>
             <a:fld id="{EDE79463-B6B2-4EDB-A96C-E4F90289A975}" type="datetimeFigureOut">
               <a:rPr lang="en-US" smtClean="0"/>
-              <a:t>10/17/2018</a:t>
+              <a:t>10/18/2018</a:t>
             </a:fld>
             <a:endParaRPr lang="en-US"/>
           </a:p>
@@ -1285,7 +1285,7 @@
           <a:p>
             <a:fld id="{F8722A89-AFF2-4300-953B-7AE403F6FDAF}" type="slidenum">
               <a:rPr lang="en-US" smtClean="0"/>
-              <a:t>‹#›</a:t>
+              <a:t>‹Nr.›</a:t>
             </a:fld>
             <a:endParaRPr lang="en-US"/>
           </a:p>
@@ -1610,7 +1610,7 @@
           <a:p>
             <a:fld id="{EDE79463-B6B2-4EDB-A96C-E4F90289A975}" type="datetimeFigureOut">
               <a:rPr lang="en-US" smtClean="0"/>
-              <a:t>10/17/2018</a:t>
+              <a:t>10/18/2018</a:t>
             </a:fld>
             <a:endParaRPr lang="en-US"/>
           </a:p>
@@ -1652,7 +1652,7 @@
           <a:p>
             <a:fld id="{F8722A89-AFF2-4300-953B-7AE403F6FDAF}" type="slidenum">
               <a:rPr lang="en-US" smtClean="0"/>
-              <a:t>‹#›</a:t>
+              <a:t>‹Nr.›</a:t>
             </a:fld>
             <a:endParaRPr lang="en-US"/>
           </a:p>
@@ -1728,7 +1728,7 @@
           <a:p>
             <a:fld id="{EDE79463-B6B2-4EDB-A96C-E4F90289A975}" type="datetimeFigureOut">
               <a:rPr lang="en-US" smtClean="0"/>
-              <a:t>10/17/2018</a:t>
+              <a:t>10/18/2018</a:t>
             </a:fld>
             <a:endParaRPr lang="en-US"/>
           </a:p>
@@ -1770,7 +1770,7 @@
           <a:p>
             <a:fld id="{F8722A89-AFF2-4300-953B-7AE403F6FDAF}" type="slidenum">
               <a:rPr lang="en-US" smtClean="0"/>
-              <a:t>‹#›</a:t>
+              <a:t>‹Nr.›</a:t>
             </a:fld>
             <a:endParaRPr lang="en-US"/>
           </a:p>
@@ -1823,7 +1823,7 @@
           <a:p>
             <a:fld id="{EDE79463-B6B2-4EDB-A96C-E4F90289A975}" type="datetimeFigureOut">
               <a:rPr lang="en-US" smtClean="0"/>
-              <a:t>10/17/2018</a:t>
+              <a:t>10/18/2018</a:t>
             </a:fld>
             <a:endParaRPr lang="en-US"/>
           </a:p>
@@ -1865,7 +1865,7 @@
           <a:p>
             <a:fld id="{F8722A89-AFF2-4300-953B-7AE403F6FDAF}" type="slidenum">
               <a:rPr lang="en-US" smtClean="0"/>
-              <a:t>‹#›</a:t>
+              <a:t>‹Nr.›</a:t>
             </a:fld>
             <a:endParaRPr lang="en-US"/>
           </a:p>
@@ -2100,7 +2100,7 @@
           <a:p>
             <a:fld id="{EDE79463-B6B2-4EDB-A96C-E4F90289A975}" type="datetimeFigureOut">
               <a:rPr lang="en-US" smtClean="0"/>
-              <a:t>10/17/2018</a:t>
+              <a:t>10/18/2018</a:t>
             </a:fld>
             <a:endParaRPr lang="en-US"/>
           </a:p>
@@ -2142,7 +2142,7 @@
           <a:p>
             <a:fld id="{F8722A89-AFF2-4300-953B-7AE403F6FDAF}" type="slidenum">
               <a:rPr lang="en-US" smtClean="0"/>
-              <a:t>‹#›</a:t>
+              <a:t>‹Nr.›</a:t>
             </a:fld>
             <a:endParaRPr lang="en-US"/>
           </a:p>
@@ -2353,7 +2353,7 @@
           <a:p>
             <a:fld id="{EDE79463-B6B2-4EDB-A96C-E4F90289A975}" type="datetimeFigureOut">
               <a:rPr lang="en-US" smtClean="0"/>
-              <a:t>10/17/2018</a:t>
+              <a:t>10/18/2018</a:t>
             </a:fld>
             <a:endParaRPr lang="en-US"/>
           </a:p>
@@ -2395,7 +2395,7 @@
           <a:p>
             <a:fld id="{F8722A89-AFF2-4300-953B-7AE403F6FDAF}" type="slidenum">
               <a:rPr lang="en-US" smtClean="0"/>
-              <a:t>‹#›</a:t>
+              <a:t>‹Nr.›</a:t>
             </a:fld>
             <a:endParaRPr lang="en-US"/>
           </a:p>
@@ -2566,7 +2566,7 @@
           <a:p>
             <a:fld id="{EDE79463-B6B2-4EDB-A96C-E4F90289A975}" type="datetimeFigureOut">
               <a:rPr lang="en-US" smtClean="0"/>
-              <a:t>10/17/2018</a:t>
+              <a:t>10/18/2018</a:t>
             </a:fld>
             <a:endParaRPr lang="en-US"/>
           </a:p>
@@ -2644,7 +2644,7 @@
           <a:p>
             <a:fld id="{F8722A89-AFF2-4300-953B-7AE403F6FDAF}" type="slidenum">
               <a:rPr lang="en-US" smtClean="0"/>
-              <a:t>‹#›</a:t>
+              <a:t>‹Nr.›</a:t>
             </a:fld>
             <a:endParaRPr lang="en-US"/>
           </a:p>
@@ -5128,59 +5128,11 @@
           <a:chExt cx="0" cy="0"/>
         </a:xfrm>
       </p:grpSpPr>
-      <p:sp>
-        <p:nvSpPr>
-          <p:cNvPr id="8" name="Rectangle 7"/>
-          <p:cNvSpPr/>
-          <p:nvPr/>
-        </p:nvSpPr>
-        <p:spPr>
-          <a:xfrm>
-            <a:off x="0" y="20782"/>
-            <a:ext cx="5056907" cy="6837218"/>
-          </a:xfrm>
-          <a:prstGeom prst="rect">
-            <a:avLst/>
-          </a:prstGeom>
-          <a:solidFill>
-            <a:schemeClr val="bg1"/>
-          </a:solidFill>
-          <a:ln>
-            <a:solidFill>
-              <a:schemeClr val="tx1"/>
-            </a:solidFill>
-          </a:ln>
-        </p:spPr>
-        <p:style>
-          <a:lnRef idx="2">
-            <a:schemeClr val="accent1">
-              <a:shade val="50000"/>
-            </a:schemeClr>
-          </a:lnRef>
-          <a:fillRef idx="1">
-            <a:schemeClr val="accent1"/>
-          </a:fillRef>
-          <a:effectRef idx="0">
-            <a:schemeClr val="accent1"/>
-          </a:effectRef>
-          <a:fontRef idx="minor">
-            <a:schemeClr val="lt1"/>
-          </a:fontRef>
-        </p:style>
-        <p:txBody>
-          <a:bodyPr rtlCol="0" anchor="ctr"/>
-          <a:lstStyle/>
-          <a:p>
-            <a:pPr algn="ctr"/>
-            <a:endParaRPr lang="en-US"/>
-          </a:p>
-        </p:txBody>
-      </p:sp>
       <p:pic>
         <p:nvPicPr>
-          <p:cNvPr id="2" name="Picture 1"/>
+          <p:cNvPr id="1027" name="Picture 3"/>
           <p:cNvPicPr>
-            <a:picLocks noChangeAspect="1"/>
+            <a:picLocks noChangeAspect="1" noChangeArrowheads="1"/>
           </p:cNvPicPr>
           <p:nvPr/>
         </p:nvPicPr>
@@ -5192,47 +5144,52 @@
               </a:ext>
             </a:extLst>
           </a:blip>
+          <a:srcRect/>
           <a:stretch>
             <a:fillRect/>
           </a:stretch>
         </p:blipFill>
-        <p:spPr>
-          <a:xfrm>
-            <a:off x="6346594" y="1162137"/>
-            <a:ext cx="4552950" cy="4552950"/>
+        <p:spPr bwMode="auto">
+          <a:xfrm>
+            <a:off x="6086475" y="1028700"/>
+            <a:ext cx="4898793" cy="4898793"/>
           </a:xfrm>
           <a:prstGeom prst="rect">
             <a:avLst/>
           </a:prstGeom>
-        </p:spPr>
-      </p:pic>
-      <p:pic>
-        <p:nvPicPr>
-          <p:cNvPr id="4" name="Picture 3"/>
-          <p:cNvPicPr>
-            <a:picLocks noChangeAspect="1"/>
-          </p:cNvPicPr>
-          <p:nvPr/>
-        </p:nvPicPr>
-        <p:blipFill rotWithShape="1">
-          <a:blip r:embed="rId3">
-            <a:extLst>
-              <a:ext uri="{28A0092B-C50C-407E-A947-70E740481C1C}">
-                <a14:useLocalDpi xmlns:a14="http://schemas.microsoft.com/office/drawing/2010/main" val="0"/>
-              </a:ext>
-            </a:extLst>
-          </a:blip>
-          <a:srcRect r="9385"/>
-          <a:stretch/>
-        </p:blipFill>
-        <p:spPr>
-          <a:xfrm>
-            <a:off x="11737406" y="0"/>
-            <a:ext cx="454594" cy="6877224"/>
-          </a:xfrm>
-          <a:prstGeom prst="rect">
-            <a:avLst/>
-          </a:prstGeom>
+          <a:noFill/>
+          <a:ln>
+            <a:noFill/>
+          </a:ln>
+          <a:effectLst/>
+          <a:extLst>
+            <a:ext uri="{909E8E84-426E-40DD-AFC4-6F175D3DCCD1}">
+              <a14:hiddenFill xmlns:a14="http://schemas.microsoft.com/office/drawing/2010/main">
+                <a:solidFill>
+                  <a:schemeClr val="accent1"/>
+                </a:solidFill>
+              </a14:hiddenFill>
+            </a:ext>
+            <a:ext uri="{91240B29-F687-4F45-9708-019B960494DF}">
+              <a14:hiddenLine xmlns:a14="http://schemas.microsoft.com/office/drawing/2010/main" w="9525">
+                <a:solidFill>
+                  <a:schemeClr val="tx1"/>
+                </a:solidFill>
+                <a:miter lim="800000"/>
+                <a:headEnd/>
+                <a:tailEnd/>
+              </a14:hiddenLine>
+            </a:ext>
+            <a:ext uri="{AF507438-7753-43E0-B8FC-AC1667EBCBE1}">
+              <a14:hiddenEffects xmlns:a14="http://schemas.microsoft.com/office/drawing/2010/main">
+                <a:effectLst>
+                  <a:outerShdw dist="35921" dir="2700000" algn="ctr" rotWithShape="0">
+                    <a:schemeClr val="bg2"/>
+                  </a:outerShdw>
+                </a:effectLst>
+              </a14:hiddenEffects>
+            </a:ext>
+          </a:extLst>
         </p:spPr>
       </p:pic>
       <p:graphicFrame>
@@ -5244,13 +5201,13 @@
           <p:nvPr>
             <p:extLst>
               <p:ext uri="{D42A27DB-BD31-4B8C-83A1-F6EECF244321}">
-                <p14:modId xmlns:p14="http://schemas.microsoft.com/office/powerpoint/2010/main" val="100193264"/>
+                <p14:modId xmlns:p14="http://schemas.microsoft.com/office/powerpoint/2010/main" val="1514143273"/>
               </p:ext>
             </p:extLst>
           </p:nvPr>
         </p:nvGraphicFramePr>
         <p:xfrm>
-          <a:off x="0" y="-27709"/>
+          <a:off x="0" y="0"/>
           <a:ext cx="5056908" cy="370840"/>
         </p:xfrm>
         <a:graphic>
@@ -5263,21 +5220,21 @@
                 <a:gridCol w="1685636">
                   <a:extLst>
                     <a:ext uri="{9D8B030D-6E8A-4147-A177-3AD203B41FA5}">
-                      <a16:colId xmlns:a16="http://schemas.microsoft.com/office/drawing/2014/main" val="1644268878"/>
+                      <a16:colId xmlns:a16="http://schemas.microsoft.com/office/drawing/2014/main" xmlns="" val="1644268878"/>
                     </a:ext>
                   </a:extLst>
                 </a:gridCol>
                 <a:gridCol w="1685636">
                   <a:extLst>
                     <a:ext uri="{9D8B030D-6E8A-4147-A177-3AD203B41FA5}">
-                      <a16:colId xmlns:a16="http://schemas.microsoft.com/office/drawing/2014/main" val="226626404"/>
+                      <a16:colId xmlns:a16="http://schemas.microsoft.com/office/drawing/2014/main" xmlns="" val="226626404"/>
                     </a:ext>
                   </a:extLst>
                 </a:gridCol>
                 <a:gridCol w="1685636">
                   <a:extLst>
                     <a:ext uri="{9D8B030D-6E8A-4147-A177-3AD203B41FA5}">
-                      <a16:colId xmlns:a16="http://schemas.microsoft.com/office/drawing/2014/main" val="1934745490"/>
+                      <a16:colId xmlns:a16="http://schemas.microsoft.com/office/drawing/2014/main" xmlns="" val="1934745490"/>
                     </a:ext>
                   </a:extLst>
                 </a:gridCol>
@@ -5304,6 +5261,29 @@
                     </a:p>
                   </a:txBody>
                   <a:tcPr>
+                    <a:lnL w="12700" cap="flat" cmpd="sng" algn="ctr">
+                      <a:noFill/>
+                      <a:prstDash val="solid"/>
+                      <a:round/>
+                      <a:headEnd type="none" w="med" len="med"/>
+                      <a:tailEnd type="none" w="med" len="med"/>
+                    </a:lnL>
+                    <a:lnT w="12700" cap="flat" cmpd="sng" algn="ctr">
+                      <a:noFill/>
+                      <a:prstDash val="solid"/>
+                      <a:round/>
+                      <a:headEnd type="none" w="med" len="med"/>
+                      <a:tailEnd type="none" w="med" len="med"/>
+                    </a:lnT>
+                    <a:lnB w="12700" cap="flat" cmpd="sng" algn="ctr">
+                      <a:solidFill>
+                        <a:schemeClr val="tx1"/>
+                      </a:solidFill>
+                      <a:prstDash val="solid"/>
+                      <a:round/>
+                      <a:headEnd type="none" w="med" len="med"/>
+                      <a:tailEnd type="none" w="med" len="med"/>
+                    </a:lnB>
                     <a:solidFill>
                       <a:schemeClr val="bg2"/>
                     </a:solidFill>
@@ -5330,6 +5310,22 @@
                     </a:p>
                   </a:txBody>
                   <a:tcPr>
+                    <a:lnT w="12700" cap="flat" cmpd="sng" algn="ctr">
+                      <a:noFill/>
+                      <a:prstDash val="solid"/>
+                      <a:round/>
+                      <a:headEnd type="none" w="med" len="med"/>
+                      <a:tailEnd type="none" w="med" len="med"/>
+                    </a:lnT>
+                    <a:lnB w="12700" cap="flat" cmpd="sng" algn="ctr">
+                      <a:solidFill>
+                        <a:schemeClr val="tx1"/>
+                      </a:solidFill>
+                      <a:prstDash val="solid"/>
+                      <a:round/>
+                      <a:headEnd type="none" w="med" len="med"/>
+                      <a:tailEnd type="none" w="med" len="med"/>
+                    </a:lnB>
                     <a:solidFill>
                       <a:schemeClr val="tx1">
                         <a:lumMod val="50000"/>
@@ -5359,6 +5355,29 @@
                     </a:p>
                   </a:txBody>
                   <a:tcPr>
+                    <a:lnR w="12700" cap="flat" cmpd="sng" algn="ctr">
+                      <a:noFill/>
+                      <a:prstDash val="solid"/>
+                      <a:round/>
+                      <a:headEnd type="none" w="med" len="med"/>
+                      <a:tailEnd type="none" w="med" len="med"/>
+                    </a:lnR>
+                    <a:lnT w="12700" cap="flat" cmpd="sng" algn="ctr">
+                      <a:noFill/>
+                      <a:prstDash val="solid"/>
+                      <a:round/>
+                      <a:headEnd type="none" w="med" len="med"/>
+                      <a:tailEnd type="none" w="med" len="med"/>
+                    </a:lnT>
+                    <a:lnB w="12700" cap="flat" cmpd="sng" algn="ctr">
+                      <a:solidFill>
+                        <a:schemeClr val="tx1"/>
+                      </a:solidFill>
+                      <a:prstDash val="solid"/>
+                      <a:round/>
+                      <a:headEnd type="none" w="med" len="med"/>
+                      <a:tailEnd type="none" w="med" len="med"/>
+                    </a:lnB>
                     <a:solidFill>
                       <a:schemeClr val="tx1">
                         <a:lumMod val="50000"/>
@@ -5369,7 +5388,7 @@
                 </a:tc>
                 <a:extLst>
                   <a:ext uri="{0D108BD9-81ED-4DB2-BD59-A6C34878D82A}">
-                    <a16:rowId xmlns:a16="http://schemas.microsoft.com/office/drawing/2014/main" val="4007779034"/>
+                    <a16:rowId xmlns:a16="http://schemas.microsoft.com/office/drawing/2014/main" xmlns="" val="4007779034"/>
                   </a:ext>
                 </a:extLst>
               </a:tr>
@@ -5385,8 +5404,8 @@
         </p:nvSpPr>
         <p:spPr>
           <a:xfrm>
-            <a:off x="193964" y="522636"/>
-            <a:ext cx="4178011" cy="5078313"/>
+            <a:off x="215480" y="533394"/>
+            <a:ext cx="4178011" cy="5355312"/>
           </a:xfrm>
           <a:prstGeom prst="rect">
             <a:avLst/>
@@ -5399,10 +5418,20 @@
           </a:bodyPr>
           <a:lstStyle/>
           <a:p>
-            <a:r>
-              <a:rPr lang="en-US" dirty="0" smtClean="0"/>
-              <a:t>This Node:</a:t>
-            </a:r>
+            <a:pPr>
+              <a:lnSpc>
+                <a:spcPct val="150000"/>
+              </a:lnSpc>
+            </a:pPr>
+            <a:r>
+              <a:rPr lang="en-US" b="1" dirty="0" smtClean="0"/>
+              <a:t>This </a:t>
+            </a:r>
+            <a:r>
+              <a:rPr lang="en-US" b="1" dirty="0" smtClean="0"/>
+              <a:t>Node</a:t>
+            </a:r>
+            <a:endParaRPr lang="en-US" b="1" dirty="0" smtClean="0"/>
           </a:p>
           <a:p>
             <a:r>
@@ -5450,9 +5479,14 @@
             <a:endParaRPr lang="en-US" dirty="0" smtClean="0"/>
           </a:p>
           <a:p>
-            <a:r>
-              <a:rPr lang="en-US" dirty="0" smtClean="0"/>
-              <a:t>Requirements:</a:t>
+            <a:pPr>
+              <a:lnSpc>
+                <a:spcPct val="150000"/>
+              </a:lnSpc>
+            </a:pPr>
+            <a:r>
+              <a:rPr lang="en-US" b="1" dirty="0" smtClean="0"/>
+              <a:t>Requirements</a:t>
             </a:r>
             <a:endParaRPr lang="en-US" dirty="0"/>
           </a:p>
@@ -5520,6 +5554,101 @@
           </a:p>
         </p:txBody>
       </p:sp>
+      <p:pic>
+        <p:nvPicPr>
+          <p:cNvPr id="1026" name="Picture 2"/>
+          <p:cNvPicPr>
+            <a:picLocks noChangeAspect="1" noChangeArrowheads="1"/>
+          </p:cNvPicPr>
+          <p:nvPr/>
+        </p:nvPicPr>
+        <p:blipFill>
+          <a:blip r:embed="rId3">
+            <a:extLst>
+              <a:ext uri="{28A0092B-C50C-407E-A947-70E740481C1C}">
+                <a14:useLocalDpi xmlns:a14="http://schemas.microsoft.com/office/drawing/2010/main" val="0"/>
+              </a:ext>
+            </a:extLst>
+          </a:blip>
+          <a:srcRect/>
+          <a:stretch>
+            <a:fillRect/>
+          </a:stretch>
+        </p:blipFill>
+        <p:spPr bwMode="auto">
+          <a:xfrm>
+            <a:off x="11734800" y="1833563"/>
+            <a:ext cx="457200" cy="3190875"/>
+          </a:xfrm>
+          <a:prstGeom prst="rect">
+            <a:avLst/>
+          </a:prstGeom>
+          <a:noFill/>
+          <a:ln>
+            <a:noFill/>
+          </a:ln>
+          <a:effectLst/>
+          <a:extLst>
+            <a:ext uri="{909E8E84-426E-40DD-AFC4-6F175D3DCCD1}">
+              <a14:hiddenFill xmlns:a14="http://schemas.microsoft.com/office/drawing/2010/main">
+                <a:solidFill>
+                  <a:schemeClr val="accent1"/>
+                </a:solidFill>
+              </a14:hiddenFill>
+            </a:ext>
+            <a:ext uri="{91240B29-F687-4F45-9708-019B960494DF}">
+              <a14:hiddenLine xmlns:a14="http://schemas.microsoft.com/office/drawing/2010/main" w="9525">
+                <a:solidFill>
+                  <a:schemeClr val="tx1"/>
+                </a:solidFill>
+                <a:miter lim="800000"/>
+                <a:headEnd/>
+                <a:tailEnd/>
+              </a14:hiddenLine>
+            </a:ext>
+            <a:ext uri="{AF507438-7753-43E0-B8FC-AC1667EBCBE1}">
+              <a14:hiddenEffects xmlns:a14="http://schemas.microsoft.com/office/drawing/2010/main">
+                <a:effectLst>
+                  <a:outerShdw dist="35921" dir="2700000" algn="ctr" rotWithShape="0">
+                    <a:schemeClr val="bg2"/>
+                  </a:outerShdw>
+                </a:effectLst>
+              </a14:hiddenEffects>
+            </a:ext>
+          </a:extLst>
+        </p:spPr>
+      </p:pic>
+      <p:cxnSp>
+        <p:nvCxnSpPr>
+          <p:cNvPr id="6" name="Gerade Verbindung 5"/>
+          <p:cNvCxnSpPr/>
+          <p:nvPr/>
+        </p:nvCxnSpPr>
+        <p:spPr>
+          <a:xfrm>
+            <a:off x="5054600" y="0"/>
+            <a:ext cx="0" cy="6858000"/>
+          </a:xfrm>
+          <a:prstGeom prst="line">
+            <a:avLst/>
+          </a:prstGeom>
+          <a:ln w="12700"/>
+        </p:spPr>
+        <p:style>
+          <a:lnRef idx="1">
+            <a:schemeClr val="dk1"/>
+          </a:lnRef>
+          <a:fillRef idx="0">
+            <a:schemeClr val="dk1"/>
+          </a:fillRef>
+          <a:effectRef idx="0">
+            <a:schemeClr val="dk1"/>
+          </a:effectRef>
+          <a:fontRef idx="minor">
+            <a:schemeClr val="tx1"/>
+          </a:fontRef>
+        </p:style>
+      </p:cxnSp>
     </p:spTree>
     <p:extLst>
       <p:ext uri="{BB962C8B-B14F-4D97-AF65-F5344CB8AC3E}">
@@ -5795,7 +5924,7 @@
   <a:extraClrSchemeLst/>
   <a:extLst>
     <a:ext uri="{05A4C25C-085E-4340-85A3-A5531E510DB2}">
-      <thm15:themeFamily xmlns:thm15="http://schemas.microsoft.com/office/thememl/2012/main" name="Office Theme" id="{62F939B6-93AF-4DB8-9C6B-D6C7DFDC589F}" vid="{4A3C46E8-61CC-4603-A589-7422A47A8E4A}"/>
+      <thm15:themeFamily xmlns:thm15="http://schemas.microsoft.com/office/thememl/2012/main" xmlns="" name="Office Theme" id="{62F939B6-93AF-4DB8-9C6B-D6C7DFDC589F}" vid="{4A3C46E8-61CC-4603-A589-7422A47A8E4A}"/>
     </a:ext>
   </a:extLst>
 </a:theme>

</xml_diff>

<commit_message>
Create template for split screen requirements tab image
</commit_message>
<xml_diff>
--- a/img/ideation/Ideas.pptx
+++ b/img/ideation/Ideas.pptx
@@ -8,6 +8,7 @@
     <p:sldId id="257" r:id="rId2"/>
     <p:sldId id="258" r:id="rId3"/>
     <p:sldId id="259" r:id="rId4"/>
+    <p:sldId id="260" r:id="rId5"/>
   </p:sldIdLst>
   <p:sldSz cx="12192000" cy="6858000"/>
   <p:notesSz cx="6858000" cy="9144000"/>
@@ -5128,70 +5129,6 @@
           <a:chExt cx="0" cy="0"/>
         </a:xfrm>
       </p:grpSpPr>
-      <p:pic>
-        <p:nvPicPr>
-          <p:cNvPr id="1027" name="Picture 3"/>
-          <p:cNvPicPr>
-            <a:picLocks noChangeAspect="1" noChangeArrowheads="1"/>
-          </p:cNvPicPr>
-          <p:nvPr/>
-        </p:nvPicPr>
-        <p:blipFill>
-          <a:blip r:embed="rId2">
-            <a:extLst>
-              <a:ext uri="{28A0092B-C50C-407E-A947-70E740481C1C}">
-                <a14:useLocalDpi xmlns:a14="http://schemas.microsoft.com/office/drawing/2010/main" val="0"/>
-              </a:ext>
-            </a:extLst>
-          </a:blip>
-          <a:srcRect/>
-          <a:stretch>
-            <a:fillRect/>
-          </a:stretch>
-        </p:blipFill>
-        <p:spPr bwMode="auto">
-          <a:xfrm>
-            <a:off x="6086475" y="1028700"/>
-            <a:ext cx="4898793" cy="4898793"/>
-          </a:xfrm>
-          <a:prstGeom prst="rect">
-            <a:avLst/>
-          </a:prstGeom>
-          <a:noFill/>
-          <a:ln>
-            <a:noFill/>
-          </a:ln>
-          <a:effectLst/>
-          <a:extLst>
-            <a:ext uri="{909E8E84-426E-40DD-AFC4-6F175D3DCCD1}">
-              <a14:hiddenFill xmlns:a14="http://schemas.microsoft.com/office/drawing/2010/main">
-                <a:solidFill>
-                  <a:schemeClr val="accent1"/>
-                </a:solidFill>
-              </a14:hiddenFill>
-            </a:ext>
-            <a:ext uri="{91240B29-F687-4F45-9708-019B960494DF}">
-              <a14:hiddenLine xmlns:a14="http://schemas.microsoft.com/office/drawing/2010/main" w="9525">
-                <a:solidFill>
-                  <a:schemeClr val="tx1"/>
-                </a:solidFill>
-                <a:miter lim="800000"/>
-                <a:headEnd/>
-                <a:tailEnd/>
-              </a14:hiddenLine>
-            </a:ext>
-            <a:ext uri="{AF507438-7753-43E0-B8FC-AC1667EBCBE1}">
-              <a14:hiddenEffects xmlns:a14="http://schemas.microsoft.com/office/drawing/2010/main">
-                <a:effectLst>
-                  <a:outerShdw dist="35921" dir="2700000" algn="ctr" rotWithShape="0">
-                    <a:schemeClr val="bg2"/>
-                  </a:outerShdw>
-                </a:effectLst>
-              </a14:hiddenEffects>
-            </a:ext>
-          </a:extLst>
-        </p:spPr>
-      </p:pic>
       <p:graphicFrame>
         <p:nvGraphicFramePr>
           <p:cNvPr id="5" name="Table 4"/>
@@ -5563,7 +5500,7 @@
           <p:nvPr/>
         </p:nvPicPr>
         <p:blipFill>
-          <a:blip r:embed="rId3">
+          <a:blip r:embed="rId2">
             <a:extLst>
               <a:ext uri="{28A0092B-C50C-407E-A947-70E740481C1C}">
                 <a14:useLocalDpi xmlns:a14="http://schemas.microsoft.com/office/drawing/2010/main" val="0"/>
@@ -5649,10 +5586,560 @@
           </a:fontRef>
         </p:style>
       </p:cxnSp>
+      <p:pic>
+        <p:nvPicPr>
+          <p:cNvPr id="1027" name="Picture 3"/>
+          <p:cNvPicPr>
+            <a:picLocks noChangeAspect="1" noChangeArrowheads="1"/>
+          </p:cNvPicPr>
+          <p:nvPr/>
+        </p:nvPicPr>
+        <p:blipFill>
+          <a:blip r:embed="rId3">
+            <a:extLst>
+              <a:ext uri="{28A0092B-C50C-407E-A947-70E740481C1C}">
+                <a14:useLocalDpi xmlns:a14="http://schemas.microsoft.com/office/drawing/2010/main" val="0"/>
+              </a:ext>
+            </a:extLst>
+          </a:blip>
+          <a:srcRect/>
+          <a:stretch>
+            <a:fillRect/>
+          </a:stretch>
+        </p:blipFill>
+        <p:spPr bwMode="auto">
+          <a:xfrm>
+            <a:off x="6086475" y="1028700"/>
+            <a:ext cx="4898793" cy="4898793"/>
+          </a:xfrm>
+          <a:prstGeom prst="rect">
+            <a:avLst/>
+          </a:prstGeom>
+          <a:noFill/>
+          <a:ln>
+            <a:noFill/>
+          </a:ln>
+          <a:effectLst/>
+          <a:extLst>
+            <a:ext uri="{909E8E84-426E-40DD-AFC4-6F175D3DCCD1}">
+              <a14:hiddenFill xmlns:a14="http://schemas.microsoft.com/office/drawing/2010/main">
+                <a:solidFill>
+                  <a:schemeClr val="accent1"/>
+                </a:solidFill>
+              </a14:hiddenFill>
+            </a:ext>
+            <a:ext uri="{91240B29-F687-4F45-9708-019B960494DF}">
+              <a14:hiddenLine xmlns:a14="http://schemas.microsoft.com/office/drawing/2010/main" w="9525">
+                <a:solidFill>
+                  <a:schemeClr val="tx1"/>
+                </a:solidFill>
+                <a:miter lim="800000"/>
+                <a:headEnd/>
+                <a:tailEnd/>
+              </a14:hiddenLine>
+            </a:ext>
+            <a:ext uri="{AF507438-7753-43E0-B8FC-AC1667EBCBE1}">
+              <a14:hiddenEffects xmlns:a14="http://schemas.microsoft.com/office/drawing/2010/main">
+                <a:effectLst>
+                  <a:outerShdw dist="35921" dir="2700000" algn="ctr" rotWithShape="0">
+                    <a:schemeClr val="bg2"/>
+                  </a:outerShdw>
+                </a:effectLst>
+              </a14:hiddenEffects>
+            </a:ext>
+          </a:extLst>
+        </p:spPr>
+      </p:pic>
     </p:spTree>
     <p:extLst>
       <p:ext uri="{BB962C8B-B14F-4D97-AF65-F5344CB8AC3E}">
         <p14:creationId xmlns:p14="http://schemas.microsoft.com/office/powerpoint/2010/main" val="3001077631"/>
+      </p:ext>
+    </p:extLst>
+  </p:cSld>
+  <p:clrMapOvr>
+    <a:masterClrMapping/>
+  </p:clrMapOvr>
+  <p:timing>
+    <p:tnLst>
+      <p:par>
+        <p:cTn id="1" dur="indefinite" restart="never" nodeType="tmRoot"/>
+      </p:par>
+    </p:tnLst>
+  </p:timing>
+</p:sld>
+</file>
+
+<file path=ppt/slides/slide4.xml><?xml version="1.0" encoding="utf-8"?>
+<p:sld xmlns:a="http://schemas.openxmlformats.org/drawingml/2006/main" xmlns:r="http://schemas.openxmlformats.org/officeDocument/2006/relationships" xmlns:p="http://schemas.openxmlformats.org/presentationml/2006/main">
+  <p:cSld>
+    <p:spTree>
+      <p:nvGrpSpPr>
+        <p:cNvPr id="1" name=""/>
+        <p:cNvGrpSpPr/>
+        <p:nvPr/>
+      </p:nvGrpSpPr>
+      <p:grpSpPr>
+        <a:xfrm>
+          <a:off x="0" y="0"/>
+          <a:ext cx="0" cy="0"/>
+          <a:chOff x="0" y="0"/>
+          <a:chExt cx="0" cy="0"/>
+        </a:xfrm>
+      </p:grpSpPr>
+      <p:pic>
+        <p:nvPicPr>
+          <p:cNvPr id="2050" name="Picture 2"/>
+          <p:cNvPicPr>
+            <a:picLocks noChangeAspect="1" noChangeArrowheads="1"/>
+          </p:cNvPicPr>
+          <p:nvPr/>
+        </p:nvPicPr>
+        <p:blipFill>
+          <a:blip r:embed="rId2">
+            <a:extLst>
+              <a:ext uri="{28A0092B-C50C-407E-A947-70E740481C1C}">
+                <a14:useLocalDpi xmlns:a14="http://schemas.microsoft.com/office/drawing/2010/main" val="0"/>
+              </a:ext>
+            </a:extLst>
+          </a:blip>
+          <a:srcRect/>
+          <a:stretch>
+            <a:fillRect/>
+          </a:stretch>
+        </p:blipFill>
+        <p:spPr bwMode="auto">
+          <a:xfrm>
+            <a:off x="6086474" y="1028699"/>
+            <a:ext cx="4898793" cy="4898793"/>
+          </a:xfrm>
+          <a:prstGeom prst="rect">
+            <a:avLst/>
+          </a:prstGeom>
+          <a:noFill/>
+          <a:ln>
+            <a:noFill/>
+          </a:ln>
+          <a:effectLst/>
+          <a:extLst>
+            <a:ext uri="{909E8E84-426E-40DD-AFC4-6F175D3DCCD1}">
+              <a14:hiddenFill xmlns:a14="http://schemas.microsoft.com/office/drawing/2010/main">
+                <a:solidFill>
+                  <a:schemeClr val="accent1"/>
+                </a:solidFill>
+              </a14:hiddenFill>
+            </a:ext>
+            <a:ext uri="{91240B29-F687-4F45-9708-019B960494DF}">
+              <a14:hiddenLine xmlns:a14="http://schemas.microsoft.com/office/drawing/2010/main" w="9525">
+                <a:solidFill>
+                  <a:schemeClr val="tx1"/>
+                </a:solidFill>
+                <a:miter lim="800000"/>
+                <a:headEnd/>
+                <a:tailEnd/>
+              </a14:hiddenLine>
+            </a:ext>
+            <a:ext uri="{AF507438-7753-43E0-B8FC-AC1667EBCBE1}">
+              <a14:hiddenEffects xmlns:a14="http://schemas.microsoft.com/office/drawing/2010/main">
+                <a:effectLst>
+                  <a:outerShdw dist="35921" dir="2700000" algn="ctr" rotWithShape="0">
+                    <a:schemeClr val="bg2"/>
+                  </a:outerShdw>
+                </a:effectLst>
+              </a14:hiddenEffects>
+            </a:ext>
+          </a:extLst>
+        </p:spPr>
+      </p:pic>
+      <p:graphicFrame>
+        <p:nvGraphicFramePr>
+          <p:cNvPr id="5" name="Table 4"/>
+          <p:cNvGraphicFramePr>
+            <a:graphicFrameLocks noGrp="1"/>
+          </p:cNvGraphicFramePr>
+          <p:nvPr>
+            <p:extLst>
+              <p:ext uri="{D42A27DB-BD31-4B8C-83A1-F6EECF244321}">
+                <p14:modId xmlns:p14="http://schemas.microsoft.com/office/powerpoint/2010/main" val="4164730428"/>
+              </p:ext>
+            </p:extLst>
+          </p:nvPr>
+        </p:nvGraphicFramePr>
+        <p:xfrm>
+          <a:off x="0" y="0"/>
+          <a:ext cx="5056908" cy="370840"/>
+        </p:xfrm>
+        <a:graphic>
+          <a:graphicData uri="http://schemas.openxmlformats.org/drawingml/2006/table">
+            <a:tbl>
+              <a:tblPr firstRow="1" bandRow="1">
+                <a:tableStyleId>{F5AB1C69-6EDB-4FF4-983F-18BD219EF322}</a:tableStyleId>
+              </a:tblPr>
+              <a:tblGrid>
+                <a:gridCol w="1685636">
+                  <a:extLst>
+                    <a:ext uri="{9D8B030D-6E8A-4147-A177-3AD203B41FA5}">
+                      <a16:colId xmlns:a16="http://schemas.microsoft.com/office/drawing/2014/main" xmlns="" val="1644268878"/>
+                    </a:ext>
+                  </a:extLst>
+                </a:gridCol>
+                <a:gridCol w="1685636">
+                  <a:extLst>
+                    <a:ext uri="{9D8B030D-6E8A-4147-A177-3AD203B41FA5}">
+                      <a16:colId xmlns:a16="http://schemas.microsoft.com/office/drawing/2014/main" xmlns="" val="226626404"/>
+                    </a:ext>
+                  </a:extLst>
+                </a:gridCol>
+                <a:gridCol w="1685636">
+                  <a:extLst>
+                    <a:ext uri="{9D8B030D-6E8A-4147-A177-3AD203B41FA5}">
+                      <a16:colId xmlns:a16="http://schemas.microsoft.com/office/drawing/2014/main" xmlns="" val="1934745490"/>
+                    </a:ext>
+                  </a:extLst>
+                </a:gridCol>
+              </a:tblGrid>
+              <a:tr h="370840">
+                <a:tc>
+                  <a:txBody>
+                    <a:bodyPr/>
+                    <a:lstStyle/>
+                    <a:p>
+                      <a:r>
+                        <a:rPr lang="en-US" dirty="0" smtClean="0">
+                          <a:solidFill>
+                            <a:schemeClr val="tx1"/>
+                          </a:solidFill>
+                        </a:rPr>
+                        <a:t>Inspect</a:t>
+                      </a:r>
+                      <a:endParaRPr lang="en-US" dirty="0">
+                        <a:solidFill>
+                          <a:schemeClr val="tx1"/>
+                        </a:solidFill>
+                      </a:endParaRPr>
+                    </a:p>
+                  </a:txBody>
+                  <a:tcPr>
+                    <a:lnL w="12700" cap="flat" cmpd="sng" algn="ctr">
+                      <a:noFill/>
+                      <a:prstDash val="solid"/>
+                      <a:round/>
+                      <a:headEnd type="none" w="med" len="med"/>
+                      <a:tailEnd type="none" w="med" len="med"/>
+                    </a:lnL>
+                    <a:lnT w="12700" cap="flat" cmpd="sng" algn="ctr">
+                      <a:noFill/>
+                      <a:prstDash val="solid"/>
+                      <a:round/>
+                      <a:headEnd type="none" w="med" len="med"/>
+                      <a:tailEnd type="none" w="med" len="med"/>
+                    </a:lnT>
+                    <a:lnB w="12700" cap="flat" cmpd="sng" algn="ctr">
+                      <a:solidFill>
+                        <a:schemeClr val="tx1"/>
+                      </a:solidFill>
+                      <a:prstDash val="solid"/>
+                      <a:round/>
+                      <a:headEnd type="none" w="med" len="med"/>
+                      <a:tailEnd type="none" w="med" len="med"/>
+                    </a:lnB>
+                    <a:solidFill>
+                      <a:schemeClr val="tx1">
+                        <a:lumMod val="50000"/>
+                        <a:lumOff val="50000"/>
+                      </a:schemeClr>
+                    </a:solidFill>
+                  </a:tcPr>
+                </a:tc>
+                <a:tc>
+                  <a:txBody>
+                    <a:bodyPr/>
+                    <a:lstStyle/>
+                    <a:p>
+                      <a:r>
+                        <a:rPr lang="en-US" dirty="0" smtClean="0">
+                          <a:solidFill>
+                            <a:schemeClr val="tx1"/>
+                          </a:solidFill>
+                        </a:rPr>
+                        <a:t>Requirements</a:t>
+                      </a:r>
+                      <a:endParaRPr lang="en-US" dirty="0">
+                        <a:solidFill>
+                          <a:schemeClr val="tx1"/>
+                        </a:solidFill>
+                      </a:endParaRPr>
+                    </a:p>
+                  </a:txBody>
+                  <a:tcPr>
+                    <a:lnT w="12700" cap="flat" cmpd="sng" algn="ctr">
+                      <a:noFill/>
+                      <a:prstDash val="solid"/>
+                      <a:round/>
+                      <a:headEnd type="none" w="med" len="med"/>
+                      <a:tailEnd type="none" w="med" len="med"/>
+                    </a:lnT>
+                    <a:lnB w="12700" cap="flat" cmpd="sng" algn="ctr">
+                      <a:solidFill>
+                        <a:schemeClr val="tx1"/>
+                      </a:solidFill>
+                      <a:prstDash val="solid"/>
+                      <a:round/>
+                      <a:headEnd type="none" w="med" len="med"/>
+                      <a:tailEnd type="none" w="med" len="med"/>
+                    </a:lnB>
+                    <a:solidFill>
+                      <a:schemeClr val="bg2"/>
+                    </a:solidFill>
+                  </a:tcPr>
+                </a:tc>
+                <a:tc>
+                  <a:txBody>
+                    <a:bodyPr/>
+                    <a:lstStyle/>
+                    <a:p>
+                      <a:r>
+                        <a:rPr lang="en-US" dirty="0" smtClean="0">
+                          <a:solidFill>
+                            <a:schemeClr val="tx1"/>
+                          </a:solidFill>
+                        </a:rPr>
+                        <a:t>Search</a:t>
+                      </a:r>
+                      <a:endParaRPr lang="en-US" dirty="0">
+                        <a:solidFill>
+                          <a:schemeClr val="tx1"/>
+                        </a:solidFill>
+                      </a:endParaRPr>
+                    </a:p>
+                  </a:txBody>
+                  <a:tcPr>
+                    <a:lnR w="12700" cap="flat" cmpd="sng" algn="ctr">
+                      <a:noFill/>
+                      <a:prstDash val="solid"/>
+                      <a:round/>
+                      <a:headEnd type="none" w="med" len="med"/>
+                      <a:tailEnd type="none" w="med" len="med"/>
+                    </a:lnR>
+                    <a:lnT w="12700" cap="flat" cmpd="sng" algn="ctr">
+                      <a:noFill/>
+                      <a:prstDash val="solid"/>
+                      <a:round/>
+                      <a:headEnd type="none" w="med" len="med"/>
+                      <a:tailEnd type="none" w="med" len="med"/>
+                    </a:lnT>
+                    <a:lnB w="12700" cap="flat" cmpd="sng" algn="ctr">
+                      <a:solidFill>
+                        <a:schemeClr val="tx1"/>
+                      </a:solidFill>
+                      <a:prstDash val="solid"/>
+                      <a:round/>
+                      <a:headEnd type="none" w="med" len="med"/>
+                      <a:tailEnd type="none" w="med" len="med"/>
+                    </a:lnB>
+                    <a:solidFill>
+                      <a:schemeClr val="tx1">
+                        <a:lumMod val="50000"/>
+                        <a:lumOff val="50000"/>
+                      </a:schemeClr>
+                    </a:solidFill>
+                  </a:tcPr>
+                </a:tc>
+                <a:extLst>
+                  <a:ext uri="{0D108BD9-81ED-4DB2-BD59-A6C34878D82A}">
+                    <a16:rowId xmlns:a16="http://schemas.microsoft.com/office/drawing/2014/main" xmlns="" val="4007779034"/>
+                  </a:ext>
+                </a:extLst>
+              </a:tr>
+            </a:tbl>
+          </a:graphicData>
+        </a:graphic>
+      </p:graphicFrame>
+      <p:sp>
+        <p:nvSpPr>
+          <p:cNvPr id="10" name="TextBox 9"/>
+          <p:cNvSpPr txBox="1"/>
+          <p:nvPr/>
+        </p:nvSpPr>
+        <p:spPr>
+          <a:xfrm>
+            <a:off x="215480" y="533393"/>
+            <a:ext cx="4603946" cy="5909310"/>
+          </a:xfrm>
+          <a:prstGeom prst="rect">
+            <a:avLst/>
+          </a:prstGeom>
+          <a:noFill/>
+        </p:spPr>
+        <p:txBody>
+          <a:bodyPr wrap="square" rtlCol="0">
+            <a:spAutoFit/>
+          </a:bodyPr>
+          <a:lstStyle/>
+          <a:p>
+            <a:endParaRPr lang="en-US" dirty="0" smtClean="0"/>
+          </a:p>
+          <a:p>
+            <a:endParaRPr lang="en-US" dirty="0" smtClean="0"/>
+          </a:p>
+          <a:p>
+            <a:endParaRPr lang="en-US" dirty="0"/>
+          </a:p>
+          <a:p>
+            <a:endParaRPr lang="en-US" dirty="0" smtClean="0"/>
+          </a:p>
+          <a:p>
+            <a:endParaRPr lang="en-US" dirty="0"/>
+          </a:p>
+          <a:p>
+            <a:endParaRPr lang="en-US" dirty="0" smtClean="0"/>
+          </a:p>
+          <a:p>
+            <a:endParaRPr lang="en-US" dirty="0"/>
+          </a:p>
+          <a:p>
+            <a:endParaRPr lang="en-US" dirty="0" smtClean="0"/>
+          </a:p>
+          <a:p>
+            <a:endParaRPr lang="en-US" dirty="0"/>
+          </a:p>
+          <a:p>
+            <a:endParaRPr lang="en-US" dirty="0" smtClean="0"/>
+          </a:p>
+          <a:p>
+            <a:endParaRPr lang="en-US" dirty="0"/>
+          </a:p>
+          <a:p>
+            <a:endParaRPr lang="en-US" dirty="0" smtClean="0"/>
+          </a:p>
+          <a:p>
+            <a:endParaRPr lang="en-US" dirty="0"/>
+          </a:p>
+          <a:p>
+            <a:endParaRPr lang="en-US" dirty="0" smtClean="0"/>
+          </a:p>
+          <a:p>
+            <a:endParaRPr lang="en-US" dirty="0"/>
+          </a:p>
+          <a:p>
+            <a:endParaRPr lang="en-US" dirty="0" smtClean="0"/>
+          </a:p>
+          <a:p>
+            <a:endParaRPr lang="en-US" dirty="0"/>
+          </a:p>
+          <a:p>
+            <a:endParaRPr lang="en-US" dirty="0" smtClean="0"/>
+          </a:p>
+          <a:p>
+            <a:endParaRPr lang="en-US" dirty="0" smtClean="0"/>
+          </a:p>
+          <a:p>
+            <a:endParaRPr lang="en-US" dirty="0"/>
+          </a:p>
+          <a:p>
+            <a:endParaRPr lang="en-US" dirty="0"/>
+          </a:p>
+        </p:txBody>
+      </p:sp>
+      <p:pic>
+        <p:nvPicPr>
+          <p:cNvPr id="1026" name="Picture 2"/>
+          <p:cNvPicPr>
+            <a:picLocks noChangeAspect="1" noChangeArrowheads="1"/>
+          </p:cNvPicPr>
+          <p:nvPr/>
+        </p:nvPicPr>
+        <p:blipFill>
+          <a:blip r:embed="rId3">
+            <a:extLst>
+              <a:ext uri="{28A0092B-C50C-407E-A947-70E740481C1C}">
+                <a14:useLocalDpi xmlns:a14="http://schemas.microsoft.com/office/drawing/2010/main" val="0"/>
+              </a:ext>
+            </a:extLst>
+          </a:blip>
+          <a:srcRect/>
+          <a:stretch>
+            <a:fillRect/>
+          </a:stretch>
+        </p:blipFill>
+        <p:spPr bwMode="auto">
+          <a:xfrm>
+            <a:off x="11734800" y="1833563"/>
+            <a:ext cx="457200" cy="3190875"/>
+          </a:xfrm>
+          <a:prstGeom prst="rect">
+            <a:avLst/>
+          </a:prstGeom>
+          <a:noFill/>
+          <a:ln>
+            <a:noFill/>
+          </a:ln>
+          <a:effectLst/>
+          <a:extLst>
+            <a:ext uri="{909E8E84-426E-40DD-AFC4-6F175D3DCCD1}">
+              <a14:hiddenFill xmlns:a14="http://schemas.microsoft.com/office/drawing/2010/main">
+                <a:solidFill>
+                  <a:schemeClr val="accent1"/>
+                </a:solidFill>
+              </a14:hiddenFill>
+            </a:ext>
+            <a:ext uri="{91240B29-F687-4F45-9708-019B960494DF}">
+              <a14:hiddenLine xmlns:a14="http://schemas.microsoft.com/office/drawing/2010/main" w="9525">
+                <a:solidFill>
+                  <a:schemeClr val="tx1"/>
+                </a:solidFill>
+                <a:miter lim="800000"/>
+                <a:headEnd/>
+                <a:tailEnd/>
+              </a14:hiddenLine>
+            </a:ext>
+            <a:ext uri="{AF507438-7753-43E0-B8FC-AC1667EBCBE1}">
+              <a14:hiddenEffects xmlns:a14="http://schemas.microsoft.com/office/drawing/2010/main">
+                <a:effectLst>
+                  <a:outerShdw dist="35921" dir="2700000" algn="ctr" rotWithShape="0">
+                    <a:schemeClr val="bg2"/>
+                  </a:outerShdw>
+                </a:effectLst>
+              </a14:hiddenEffects>
+            </a:ext>
+          </a:extLst>
+        </p:spPr>
+      </p:pic>
+      <p:cxnSp>
+        <p:nvCxnSpPr>
+          <p:cNvPr id="6" name="Gerade Verbindung 5"/>
+          <p:cNvCxnSpPr/>
+          <p:nvPr/>
+        </p:nvCxnSpPr>
+        <p:spPr>
+          <a:xfrm>
+            <a:off x="5054600" y="0"/>
+            <a:ext cx="0" cy="6858000"/>
+          </a:xfrm>
+          <a:prstGeom prst="line">
+            <a:avLst/>
+          </a:prstGeom>
+          <a:ln w="12700"/>
+        </p:spPr>
+        <p:style>
+          <a:lnRef idx="1">
+            <a:schemeClr val="dk1"/>
+          </a:lnRef>
+          <a:fillRef idx="0">
+            <a:schemeClr val="dk1"/>
+          </a:fillRef>
+          <a:effectRef idx="0">
+            <a:schemeClr val="dk1"/>
+          </a:effectRef>
+          <a:fontRef idx="minor">
+            <a:schemeClr val="tx1"/>
+          </a:fontRef>
+        </p:style>
+      </p:cxnSp>
+    </p:spTree>
+    <p:extLst>
+      <p:ext uri="{BB962C8B-B14F-4D97-AF65-F5344CB8AC3E}">
+        <p14:creationId xmlns:p14="http://schemas.microsoft.com/office/powerpoint/2010/main" val="1643887133"/>
       </p:ext>
     </p:extLst>
   </p:cSld>

</xml_diff>